<commit_message>
Add years to covid story
Addresses #103
</commit_message>
<xml_diff>
--- a/summary.pptx
+++ b/summary.pptx
@@ -266,7 +266,7 @@
           <a:p>
             <a:fld id="{0B842F42-2CE9-4E35-95C1-410DC08A50B1}" type="datetimeFigureOut">
               <a:rPr lang="en-US" smtClean="0"/>
-              <a:t>10/12/2021</a:t>
+              <a:t>11/14/2021</a:t>
             </a:fld>
             <a:endParaRPr lang="en-US"/>
           </a:p>
@@ -431,7 +431,7 @@
           <a:p>
             <a:fld id="{6F282904-F315-4730-8D91-37D99E141A6F}" type="datetimeFigureOut">
               <a:rPr lang="en-US" smtClean="0"/>
-              <a:t>10/12/2021</a:t>
+              <a:t>11/14/2021</a:t>
             </a:fld>
             <a:endParaRPr lang="en-US"/>
           </a:p>
@@ -6130,7 +6130,7 @@
           <a:p>
             <a:r>
               <a:rPr lang="en-US" sz="2000" dirty="0"/>
-              <a:t>Mar. 16: Neil Ferguson (Imperial College) briefed UK Parliament on epidemiological modeling of COVID-19 pandemic</a:t>
+              <a:t>Mar. 16 2020: Neil Ferguson (Imperial College) briefed UK Parliament on epidemiological modeling of COVID-19 pandemic</a:t>
             </a:r>
           </a:p>
           <a:p>
@@ -6147,7 +6147,7 @@
           <a:p>
             <a:r>
               <a:rPr lang="en-US" sz="2000" dirty="0"/>
-              <a:t>April 1: Nicholas Lewis (independent climate science researcher in UK) can’t easily see where some of the assumptions come from – publishes a blog article</a:t>
+              <a:t>April 1 2020: Nicholas Lewis (independent climate science researcher in UK) can’t easily see where some of the assumptions come from – publishes a blog article</a:t>
             </a:r>
           </a:p>
           <a:p>
@@ -6966,13 +6966,13 @@
           <a:p>
             <a:r>
               <a:rPr lang="en-US" dirty="0"/>
-              <a:t>April 22: Imperial collaborates with Microsoft to refactor and clean up the code, which is released on GitHub</a:t>
+              <a:t>April 22 2020: Imperial collaborates with Microsoft to refactor and clean up the code, which is released on GitHub</a:t>
             </a:r>
           </a:p>
           <a:p>
             <a:r>
               <a:rPr lang="en-US" dirty="0"/>
-              <a:t>May 10: Phil Bull rebuts criticisms of the Imperial code</a:t>
+              <a:t>May 10 2020: Phil Bull rebuts criticisms of the Imperial code</a:t>
             </a:r>
           </a:p>
           <a:p>
@@ -6985,7 +6985,7 @@
           <a:p>
             <a:r>
               <a:rPr lang="en-US" dirty="0"/>
-              <a:t>May 29: CODECHECK independently reproduces results of Imperial’s Report 9</a:t>
+              <a:t>May 29 2020: CODECHECK independently reproduces results of Imperial’s Report 9</a:t>
             </a:r>
           </a:p>
         </p:txBody>
@@ -8972,21 +8972,6 @@
 </file>
 
 <file path=customXml/item1.xml><?xml version="1.0" encoding="utf-8"?>
-<p:properties xmlns:p="http://schemas.microsoft.com/office/2006/metadata/properties" xmlns:xsi="http://www.w3.org/2001/XMLSchema-instance" xmlns:pc="http://schemas.microsoft.com/office/infopath/2007/PartnerControls">
-  <documentManagement/>
-</p:properties>
-</file>
-
-<file path=customXml/item2.xml><?xml version="1.0" encoding="utf-8"?>
-<?mso-contentType ?>
-<FormTemplates xmlns="http://schemas.microsoft.com/sharepoint/v3/contenttype/forms">
-  <Display>DocumentLibraryForm</Display>
-  <Edit>DocumentLibraryForm</Edit>
-  <New>DocumentLibraryForm</New>
-</FormTemplates>
-</file>
-
-<file path=customXml/item3.xml><?xml version="1.0" encoding="utf-8"?>
 <ct:contentTypeSchema xmlns:ct="http://schemas.microsoft.com/office/2006/metadata/contentType" xmlns:ma="http://schemas.microsoft.com/office/2006/metadata/properties/metaAttributes" ct:_="" ma:_="" ma:contentTypeName="Document" ma:contentTypeID="0x010100565464437F680748A68B85EB6594EA7D" ma:contentTypeVersion="0" ma:contentTypeDescription="Create a new document." ma:contentTypeScope="" ma:versionID="fe3f4dd58d5914c51cfc6deaa8ad845c">
   <xsd:schema xmlns:xsd="http://www.w3.org/2001/XMLSchema" xmlns:p="http://schemas.microsoft.com/office/2006/metadata/properties" targetNamespace="http://schemas.microsoft.com/office/2006/metadata/properties" ma:root="true" ma:fieldsID="4aeb20c0e3442673af7ee10786458764">
     <xsd:element name="properties">
@@ -9035,17 +9020,32 @@
 </ct:contentTypeSchema>
 </file>
 
+<file path=customXml/item2.xml><?xml version="1.0" encoding="utf-8"?>
+<?mso-contentType ?>
+<FormTemplates xmlns="http://schemas.microsoft.com/sharepoint/v3/contenttype/forms">
+  <Display>DocumentLibraryForm</Display>
+  <Edit>DocumentLibraryForm</Edit>
+  <New>DocumentLibraryForm</New>
+</FormTemplates>
+</file>
+
+<file path=customXml/item3.xml><?xml version="1.0" encoding="utf-8"?>
+<p:properties xmlns:p="http://schemas.microsoft.com/office/2006/metadata/properties" xmlns:xsi="http://www.w3.org/2001/XMLSchema-instance" xmlns:pc="http://schemas.microsoft.com/office/infopath/2007/PartnerControls">
+  <documentManagement/>
+</p:properties>
+</file>
+
 <file path=customXml/itemProps1.xml><?xml version="1.0" encoding="utf-8"?>
-<ds:datastoreItem xmlns:ds="http://schemas.openxmlformats.org/officeDocument/2006/customXml" ds:itemID="{A50EC660-24D0-43A0-AE5E-E274115E726B}">
+<ds:datastoreItem xmlns:ds="http://schemas.openxmlformats.org/officeDocument/2006/customXml" ds:itemID="{E8DB7DEB-074E-4EE8-9B6E-FD277323109C}">
   <ds:schemaRefs>
+    <ds:schemaRef ds:uri="http://schemas.microsoft.com/office/2006/metadata/contentType"/>
+    <ds:schemaRef ds:uri="http://schemas.microsoft.com/office/2006/metadata/properties/metaAttributes"/>
+    <ds:schemaRef ds:uri="http://www.w3.org/2001/XMLSchema"/>
+    <ds:schemaRef ds:uri="http://schemas.microsoft.com/office/2006/metadata/properties"/>
+    <ds:schemaRef ds:uri="http://schemas.openxmlformats.org/package/2006/metadata/core-properties"/>
     <ds:schemaRef ds:uri="http://purl.org/dc/elements/1.1/"/>
-    <ds:schemaRef ds:uri="http://schemas.microsoft.com/office/2006/metadata/properties"/>
     <ds:schemaRef ds:uri="http://purl.org/dc/terms/"/>
-    <ds:schemaRef ds:uri="http://schemas.openxmlformats.org/package/2006/metadata/core-properties"/>
-    <ds:schemaRef ds:uri="http://schemas.microsoft.com/office/2006/documentManagement/types"/>
-    <ds:schemaRef ds:uri="http://www.w3.org/XML/1998/namespace"/>
-    <ds:schemaRef ds:uri="http://purl.org/dc/dcmitype/"/>
-    <ds:schemaRef ds:uri="http://schemas.microsoft.com/office/infopath/2007/PartnerControls"/>
+    <ds:schemaRef ds:uri="http://schemas.microsoft.com/office/internal/2005/internalDocumentation"/>
   </ds:schemaRefs>
 </ds:datastoreItem>
 </file>
@@ -9059,16 +9059,16 @@
 </file>
 
 <file path=customXml/itemProps3.xml><?xml version="1.0" encoding="utf-8"?>
-<ds:datastoreItem xmlns:ds="http://schemas.openxmlformats.org/officeDocument/2006/customXml" ds:itemID="{E8DB7DEB-074E-4EE8-9B6E-FD277323109C}">
+<ds:datastoreItem xmlns:ds="http://schemas.openxmlformats.org/officeDocument/2006/customXml" ds:itemID="{A50EC660-24D0-43A0-AE5E-E274115E726B}">
   <ds:schemaRefs>
-    <ds:schemaRef ds:uri="http://schemas.microsoft.com/office/2006/metadata/contentType"/>
-    <ds:schemaRef ds:uri="http://schemas.microsoft.com/office/2006/metadata/properties/metaAttributes"/>
-    <ds:schemaRef ds:uri="http://www.w3.org/2001/XMLSchema"/>
+    <ds:schemaRef ds:uri="http://purl.org/dc/elements/1.1/"/>
     <ds:schemaRef ds:uri="http://schemas.microsoft.com/office/2006/metadata/properties"/>
+    <ds:schemaRef ds:uri="http://purl.org/dc/terms/"/>
     <ds:schemaRef ds:uri="http://schemas.openxmlformats.org/package/2006/metadata/core-properties"/>
-    <ds:schemaRef ds:uri="http://purl.org/dc/elements/1.1/"/>
-    <ds:schemaRef ds:uri="http://purl.org/dc/terms/"/>
-    <ds:schemaRef ds:uri="http://schemas.microsoft.com/office/internal/2005/internalDocumentation"/>
+    <ds:schemaRef ds:uri="http://schemas.microsoft.com/office/2006/documentManagement/types"/>
+    <ds:schemaRef ds:uri="http://www.w3.org/XML/1998/namespace"/>
+    <ds:schemaRef ds:uri="http://purl.org/dc/dcmitype/"/>
+    <ds:schemaRef ds:uri="http://schemas.microsoft.com/office/infopath/2007/PartnerControls"/>
   </ds:schemaRefs>
 </ds:datastoreItem>
 </file>
</xml_diff>

<commit_message>
Small changes to summary
</commit_message>
<xml_diff>
--- a/summary.pptx
+++ b/summary.pptx
@@ -262,7 +262,7 @@
           <a:p>
             <a:fld id="{0B842F42-2CE9-4E35-95C1-410DC08A50B1}" type="datetimeFigureOut">
               <a:rPr lang="en-US" smtClean="0"/>
-              <a:t>10/27/2022</a:t>
+              <a:t>4/3/23</a:t>
             </a:fld>
             <a:endParaRPr lang="en-US"/>
           </a:p>
@@ -427,7 +427,7 @@
           <a:p>
             <a:fld id="{6F282904-F315-4730-8D91-37D99E141A6F}" type="datetimeFigureOut">
               <a:rPr lang="en-US" smtClean="0"/>
-              <a:t>10/27/2022</a:t>
+              <a:t>4/3/23</a:t>
             </a:fld>
             <a:endParaRPr lang="en-US"/>
           </a:p>
@@ -4107,18 +4107,18 @@
           <a:p>
             <a:r>
               <a:rPr lang="en-US" u="sng" dirty="0"/>
-              <a:t>David E. Bernholdt </a:t>
+              <a:t>Patricia Grubel</a:t>
             </a:r>
             <a:r>
               <a:rPr lang="en-US" sz="2000" dirty="0"/>
-              <a:t>(he/him)</a:t>
+              <a:t>(she/her)</a:t>
             </a:r>
             <a:br>
               <a:rPr lang="en-US" sz="2000" u="sng" dirty="0"/>
             </a:br>
             <a:r>
               <a:rPr lang="en-US" sz="2000" dirty="0"/>
-              <a:t>Oak Ridge National Laboratory</a:t>
+              <a:t>Los Alamos National Laboratory</a:t>
             </a:r>
           </a:p>
           <a:p>
@@ -4129,7 +4129,7 @@
             </a:pPr>
             <a:r>
               <a:rPr lang="en-US" sz="2000" dirty="0"/>
-              <a:t>Better Scientific Software tutorial @ SC22</a:t>
+              <a:t>Better Scientific Software tutorial @ </a:t>
             </a:r>
           </a:p>
           <a:p>
@@ -4140,7 +4140,61 @@
             </a:pPr>
             <a:r>
               <a:rPr lang="en-US" sz="2000" dirty="0"/>
-              <a:t>Contributors: David E. Bernholdt (ORNL), Anshu Dubey (ANL), David M. Rogers (ORNL)</a:t>
+              <a:t>Contributors: David E. Bernholdt (ORNL), </a:t>
+            </a:r>
+            <a:r>
+              <a:rPr lang="en-US" sz="2000" dirty="0" err="1"/>
+              <a:t>Anshu</a:t>
+            </a:r>
+            <a:r>
+              <a:rPr lang="en-US" sz="2000" dirty="0"/>
+              <a:t> Dubey (ANL), </a:t>
+            </a:r>
+            <a:r>
+              <a:rPr lang="en-US" sz="2000"/>
+              <a:t>Patricia Grubel, David </a:t>
+            </a:r>
+            <a:r>
+              <a:rPr lang="en-US" sz="2000" dirty="0"/>
+              <a:t>M. Rogers (ORNL)</a:t>
+            </a:r>
+          </a:p>
+        </p:txBody>
+      </p:sp>
+      <p:sp>
+        <p:nvSpPr>
+          <p:cNvPr id="3" name="TextBox 2">
+            <a:extLst>
+              <a:ext uri="{FF2B5EF4-FFF2-40B4-BE49-F238E27FC236}">
+                <a16:creationId xmlns:a16="http://schemas.microsoft.com/office/drawing/2014/main" id="{2D29CF90-BF55-49DC-D64D-47B71966DF64}"/>
+              </a:ext>
+            </a:extLst>
+          </p:cNvPr>
+          <p:cNvSpPr txBox="1"/>
+          <p:nvPr/>
+        </p:nvSpPr>
+        <p:spPr>
+          <a:xfrm>
+            <a:off x="9810888" y="5748995"/>
+            <a:ext cx="2089702" cy="369332"/>
+          </a:xfrm>
+          <a:prstGeom prst="rect">
+            <a:avLst/>
+          </a:prstGeom>
+          <a:noFill/>
+        </p:spPr>
+        <p:txBody>
+          <a:bodyPr wrap="square">
+            <a:spAutoFit/>
+          </a:bodyPr>
+          <a:lstStyle/>
+          <a:p>
+            <a:r>
+              <a:rPr lang="en-US" sz="1800" dirty="0">
+                <a:effectLst/>
+                <a:latin typeface="+mn-lt"/>
+              </a:rPr>
+              <a:t>LA-UR-23-XXXXX</a:t>
             </a:r>
           </a:p>
         </p:txBody>
@@ -4613,19 +4667,31 @@
           <a:p>
             <a:r>
               <a:rPr lang="en-US" dirty="0"/>
+              <a:t>Refactoring software</a:t>
+            </a:r>
+          </a:p>
+          <a:p>
+            <a:r>
+              <a:rPr lang="en-US" dirty="0"/>
               <a:t>Collaborative software development</a:t>
+            </a:r>
+          </a:p>
+          <a:p>
+            <a:r>
+              <a:rPr lang="en-US" dirty="0"/>
+              <a:t>Packaging</a:t>
+            </a:r>
+          </a:p>
+          <a:p>
+            <a:r>
+              <a:rPr lang="en-US" dirty="0"/>
+              <a:t>Testing strategies for complex software systems</a:t>
             </a:r>
           </a:p>
           <a:p>
             <a:r>
               <a:rPr lang="en-US" dirty="0"/>
               <a:t>Reproducibility</a:t>
-            </a:r>
-          </a:p>
-          <a:p>
-            <a:r>
-              <a:rPr lang="en-US" dirty="0"/>
-              <a:t>Testing strategies for complex software systems</a:t>
             </a:r>
           </a:p>
         </p:txBody>
@@ -4757,7 +4823,7 @@
             </a:pPr>
             <a:r>
               <a:rPr lang="en-US" dirty="0"/>
-              <a:t>Packaging and distribution</a:t>
+              <a:t>Distribution</a:t>
             </a:r>
           </a:p>
           <a:p>
@@ -4779,7 +4845,7 @@
             </a:pPr>
             <a:r>
               <a:rPr lang="en-US" dirty="0"/>
-              <a:t>Configuration and build</a:t>
+              <a:t>Configuration and building</a:t>
             </a:r>
           </a:p>
           <a:p>
@@ -6537,71 +6603,6 @@
           </a:prstGeom>
         </p:spPr>
       </p:pic>
-      <p:sp>
-        <p:nvSpPr>
-          <p:cNvPr id="4" name="TextBox 3">
-            <a:extLst>
-              <a:ext uri="{FF2B5EF4-FFF2-40B4-BE49-F238E27FC236}">
-                <a16:creationId xmlns:a16="http://schemas.microsoft.com/office/drawing/2014/main" id="{10A66B8C-AF67-6D20-0B3A-CE53D1DB1ADC}"/>
-              </a:ext>
-            </a:extLst>
-          </p:cNvPr>
-          <p:cNvSpPr txBox="1"/>
-          <p:nvPr/>
-        </p:nvSpPr>
-        <p:spPr>
-          <a:xfrm>
-            <a:off x="6682265" y="2815357"/>
-            <a:ext cx="5140800" cy="1763560"/>
-          </a:xfrm>
-          <a:prstGeom prst="rect">
-            <a:avLst/>
-          </a:prstGeom>
-          <a:solidFill>
-            <a:srgbClr val="FFFF00"/>
-          </a:solidFill>
-          <a:ln w="28575">
-            <a:solidFill>
-              <a:schemeClr val="tx1"/>
-            </a:solidFill>
-          </a:ln>
-        </p:spPr>
-        <p:txBody>
-          <a:bodyPr wrap="square" lIns="118872" tIns="91440" rIns="118872" bIns="91440" rtlCol="0" anchor="ctr" anchorCtr="0">
-            <a:spAutoFit/>
-          </a:bodyPr>
-          <a:lstStyle/>
-          <a:p>
-            <a:pPr algn="ctr">
-              <a:lnSpc>
-                <a:spcPct val="90000"/>
-              </a:lnSpc>
-            </a:pPr>
-            <a:r>
-              <a:rPr lang="en-US" sz="2400" dirty="0"/>
-              <a:t>You may also be interested in these other software-related events at SC22: </a:t>
-            </a:r>
-            <a:r>
-              <a:rPr lang="en-US" sz="2400" dirty="0">
-                <a:hlinkClick r:id="rId10"/>
-              </a:rPr>
-              <a:t>https://bssw.io/events/sc22-software-related-events</a:t>
-            </a:r>
-            <a:endParaRPr lang="en-US" sz="2400" dirty="0"/>
-          </a:p>
-          <a:p>
-            <a:pPr algn="ctr">
-              <a:lnSpc>
-                <a:spcPct val="90000"/>
-              </a:lnSpc>
-            </a:pPr>
-            <a:r>
-              <a:rPr lang="en-US" dirty="0"/>
-              <a:t>(link is also on tutorial webpage)</a:t>
-            </a:r>
-          </a:p>
-        </p:txBody>
-      </p:sp>
     </p:spTree>
     <p:extLst>
       <p:ext uri="{BB962C8B-B14F-4D97-AF65-F5344CB8AC3E}">
@@ -7528,6 +7529,21 @@
 </file>
 
 <file path=customXml/item1.xml><?xml version="1.0" encoding="utf-8"?>
+<?mso-contentType ?>
+<FormTemplates xmlns="http://schemas.microsoft.com/sharepoint/v3/contenttype/forms">
+  <Display>DocumentLibraryForm</Display>
+  <Edit>DocumentLibraryForm</Edit>
+  <New>DocumentLibraryForm</New>
+</FormTemplates>
+</file>
+
+<file path=customXml/item2.xml><?xml version="1.0" encoding="utf-8"?>
+<p:properties xmlns:p="http://schemas.microsoft.com/office/2006/metadata/properties" xmlns:xsi="http://www.w3.org/2001/XMLSchema-instance" xmlns:pc="http://schemas.microsoft.com/office/infopath/2007/PartnerControls">
+  <documentManagement/>
+</p:properties>
+</file>
+
+<file path=customXml/item3.xml><?xml version="1.0" encoding="utf-8"?>
 <ct:contentTypeSchema xmlns:ct="http://schemas.microsoft.com/office/2006/metadata/contentType" xmlns:ma="http://schemas.microsoft.com/office/2006/metadata/properties/metaAttributes" ct:_="" ma:_="" ma:contentTypeName="Document" ma:contentTypeID="0x010100565464437F680748A68B85EB6594EA7D" ma:contentTypeVersion="0" ma:contentTypeDescription="Create a new document." ma:contentTypeScope="" ma:versionID="fe3f4dd58d5914c51cfc6deaa8ad845c">
   <xsd:schema xmlns:xsd="http://www.w3.org/2001/XMLSchema" xmlns:p="http://schemas.microsoft.com/office/2006/metadata/properties" targetNamespace="http://schemas.microsoft.com/office/2006/metadata/properties" ma:root="true" ma:fieldsID="4aeb20c0e3442673af7ee10786458764">
     <xsd:element name="properties">
@@ -7576,32 +7592,10 @@
 </ct:contentTypeSchema>
 </file>
 
-<file path=customXml/item2.xml><?xml version="1.0" encoding="utf-8"?>
-<p:properties xmlns:p="http://schemas.microsoft.com/office/2006/metadata/properties" xmlns:xsi="http://www.w3.org/2001/XMLSchema-instance" xmlns:pc="http://schemas.microsoft.com/office/infopath/2007/PartnerControls">
-  <documentManagement/>
-</p:properties>
-</file>
-
-<file path=customXml/item3.xml><?xml version="1.0" encoding="utf-8"?>
-<?mso-contentType ?>
-<FormTemplates xmlns="http://schemas.microsoft.com/sharepoint/v3/contenttype/forms">
-  <Display>DocumentLibraryForm</Display>
-  <Edit>DocumentLibraryForm</Edit>
-  <New>DocumentLibraryForm</New>
-</FormTemplates>
-</file>
-
 <file path=customXml/itemProps1.xml><?xml version="1.0" encoding="utf-8"?>
-<ds:datastoreItem xmlns:ds="http://schemas.openxmlformats.org/officeDocument/2006/customXml" ds:itemID="{E8DB7DEB-074E-4EE8-9B6E-FD277323109C}">
+<ds:datastoreItem xmlns:ds="http://schemas.openxmlformats.org/officeDocument/2006/customXml" ds:itemID="{19E20559-B232-4371-8690-E3D8007EDB82}">
   <ds:schemaRefs>
-    <ds:schemaRef ds:uri="http://schemas.microsoft.com/office/2006/metadata/contentType"/>
-    <ds:schemaRef ds:uri="http://schemas.microsoft.com/office/2006/metadata/properties/metaAttributes"/>
-    <ds:schemaRef ds:uri="http://www.w3.org/2001/XMLSchema"/>
-    <ds:schemaRef ds:uri="http://schemas.microsoft.com/office/2006/metadata/properties"/>
-    <ds:schemaRef ds:uri="http://schemas.openxmlformats.org/package/2006/metadata/core-properties"/>
-    <ds:schemaRef ds:uri="http://purl.org/dc/elements/1.1/"/>
-    <ds:schemaRef ds:uri="http://purl.org/dc/terms/"/>
-    <ds:schemaRef ds:uri="http://schemas.microsoft.com/office/internal/2005/internalDocumentation"/>
+    <ds:schemaRef ds:uri="http://schemas.microsoft.com/sharepoint/v3/contenttype/forms"/>
   </ds:schemaRefs>
 </ds:datastoreItem>
 </file>
@@ -7622,9 +7616,16 @@
 </file>
 
 <file path=customXml/itemProps3.xml><?xml version="1.0" encoding="utf-8"?>
-<ds:datastoreItem xmlns:ds="http://schemas.openxmlformats.org/officeDocument/2006/customXml" ds:itemID="{19E20559-B232-4371-8690-E3D8007EDB82}">
+<ds:datastoreItem xmlns:ds="http://schemas.openxmlformats.org/officeDocument/2006/customXml" ds:itemID="{E8DB7DEB-074E-4EE8-9B6E-FD277323109C}">
   <ds:schemaRefs>
-    <ds:schemaRef ds:uri="http://schemas.microsoft.com/sharepoint/v3/contenttype/forms"/>
+    <ds:schemaRef ds:uri="http://schemas.microsoft.com/office/2006/metadata/contentType"/>
+    <ds:schemaRef ds:uri="http://schemas.microsoft.com/office/2006/metadata/properties/metaAttributes"/>
+    <ds:schemaRef ds:uri="http://www.w3.org/2001/XMLSchema"/>
+    <ds:schemaRef ds:uri="http://schemas.microsoft.com/office/2006/metadata/properties"/>
+    <ds:schemaRef ds:uri="http://schemas.openxmlformats.org/package/2006/metadata/core-properties"/>
+    <ds:schemaRef ds:uri="http://purl.org/dc/elements/1.1/"/>
+    <ds:schemaRef ds:uri="http://purl.org/dc/terms/"/>
+    <ds:schemaRef ds:uri="http://schemas.microsoft.com/office/internal/2005/internalDocumentation"/>
   </ds:schemaRefs>
 </ds:datastoreItem>
 </file>
</xml_diff>

<commit_message>
Minor updates for SC23
</commit_message>
<xml_diff>
--- a/summary.pptx
+++ b/summary.pptx
@@ -262,7 +262,7 @@
           <a:p>
             <a:fld id="{0B842F42-2CE9-4E35-95C1-410DC08A50B1}" type="datetimeFigureOut">
               <a:rPr lang="en-US" smtClean="0"/>
-              <a:t>8/3/2023</a:t>
+              <a:t>10/22/2023</a:t>
             </a:fld>
             <a:endParaRPr lang="en-US"/>
           </a:p>
@@ -427,7 +427,7 @@
           <a:p>
             <a:fld id="{6F282904-F315-4730-8D91-37D99E141A6F}" type="datetimeFigureOut">
               <a:rPr lang="en-US" smtClean="0"/>
-              <a:t>8/3/2023</a:t>
+              <a:t>10/22/2023</a:t>
             </a:fld>
             <a:endParaRPr lang="en-US"/>
           </a:p>
@@ -4676,6 +4676,12 @@
             <a:r>
               <a:rPr lang="en-US" dirty="0"/>
               <a:t>Collaborative software development</a:t>
+            </a:r>
+          </a:p>
+          <a:p>
+            <a:r>
+              <a:rPr lang="en-US" dirty="0"/>
+              <a:t>Software packaging</a:t>
             </a:r>
           </a:p>
           <a:p>
@@ -6611,6 +6617,67 @@
           </a:prstGeom>
         </p:spPr>
       </p:pic>
+      <p:sp>
+        <p:nvSpPr>
+          <p:cNvPr id="4" name="TextBox 3">
+            <a:extLst>
+              <a:ext uri="{FF2B5EF4-FFF2-40B4-BE49-F238E27FC236}">
+                <a16:creationId xmlns:a16="http://schemas.microsoft.com/office/drawing/2014/main" id="{06FB4D60-A43C-03F5-7B52-92FAC8621C4A}"/>
+              </a:ext>
+            </a:extLst>
+          </p:cNvPr>
+          <p:cNvSpPr txBox="1"/>
+          <p:nvPr/>
+        </p:nvSpPr>
+        <p:spPr>
+          <a:xfrm>
+            <a:off x="6354697" y="2772101"/>
+            <a:ext cx="5465397" cy="1846659"/>
+          </a:xfrm>
+          <a:prstGeom prst="rect">
+            <a:avLst/>
+          </a:prstGeom>
+          <a:solidFill>
+            <a:srgbClr val="FFFF00"/>
+          </a:solidFill>
+          <a:ln>
+            <a:solidFill>
+              <a:schemeClr val="tx1"/>
+            </a:solidFill>
+          </a:ln>
+        </p:spPr>
+        <p:txBody>
+          <a:bodyPr wrap="square" lIns="118872" tIns="91440" rIns="118872" bIns="91440" rtlCol="0" anchor="ctr" anchorCtr="0">
+            <a:spAutoFit/>
+          </a:bodyPr>
+          <a:lstStyle/>
+          <a:p>
+            <a:pPr algn="ctr">
+              <a:lnSpc>
+                <a:spcPct val="90000"/>
+              </a:lnSpc>
+            </a:pPr>
+            <a:r>
+              <a:rPr lang="en-US" sz="2400" dirty="0"/>
+              <a:t>You may also be interested in these other software-related events at SC23: </a:t>
+            </a:r>
+            <a:r>
+              <a:rPr lang="en-US" sz="2400" dirty="0">
+                <a:hlinkClick r:id="rId10"/>
+              </a:rPr>
+              <a:t>https://bssw.io/events/sc23-software-related-events</a:t>
+            </a:r>
+            <a:br>
+              <a:rPr lang="en-US" sz="2400" dirty="0"/>
+            </a:br>
+            <a:r>
+              <a:rPr lang="en-US" dirty="0"/>
+              <a:t>(link is also on tutorial web page)</a:t>
+            </a:r>
+            <a:endParaRPr lang="en-US" sz="2400" dirty="0"/>
+          </a:p>
+        </p:txBody>
+      </p:sp>
     </p:spTree>
     <p:extLst>
       <p:ext uri="{BB962C8B-B14F-4D97-AF65-F5344CB8AC3E}">
@@ -7537,6 +7604,21 @@
 </file>
 
 <file path=customXml/item1.xml><?xml version="1.0" encoding="utf-8"?>
+<?mso-contentType ?>
+<FormTemplates xmlns="http://schemas.microsoft.com/sharepoint/v3/contenttype/forms">
+  <Display>DocumentLibraryForm</Display>
+  <Edit>DocumentLibraryForm</Edit>
+  <New>DocumentLibraryForm</New>
+</FormTemplates>
+</file>
+
+<file path=customXml/item2.xml><?xml version="1.0" encoding="utf-8"?>
+<p:properties xmlns:p="http://schemas.microsoft.com/office/2006/metadata/properties" xmlns:xsi="http://www.w3.org/2001/XMLSchema-instance" xmlns:pc="http://schemas.microsoft.com/office/infopath/2007/PartnerControls">
+  <documentManagement/>
+</p:properties>
+</file>
+
+<file path=customXml/item3.xml><?xml version="1.0" encoding="utf-8"?>
 <ct:contentTypeSchema xmlns:ct="http://schemas.microsoft.com/office/2006/metadata/contentType" xmlns:ma="http://schemas.microsoft.com/office/2006/metadata/properties/metaAttributes" ct:_="" ma:_="" ma:contentTypeName="Document" ma:contentTypeID="0x010100565464437F680748A68B85EB6594EA7D" ma:contentTypeVersion="0" ma:contentTypeDescription="Create a new document." ma:contentTypeScope="" ma:versionID="fe3f4dd58d5914c51cfc6deaa8ad845c">
   <xsd:schema xmlns:xsd="http://www.w3.org/2001/XMLSchema" xmlns:p="http://schemas.microsoft.com/office/2006/metadata/properties" targetNamespace="http://schemas.microsoft.com/office/2006/metadata/properties" ma:root="true" ma:fieldsID="4aeb20c0e3442673af7ee10786458764">
     <xsd:element name="properties">
@@ -7585,32 +7667,10 @@
 </ct:contentTypeSchema>
 </file>
 
-<file path=customXml/item2.xml><?xml version="1.0" encoding="utf-8"?>
-<p:properties xmlns:p="http://schemas.microsoft.com/office/2006/metadata/properties" xmlns:xsi="http://www.w3.org/2001/XMLSchema-instance" xmlns:pc="http://schemas.microsoft.com/office/infopath/2007/PartnerControls">
-  <documentManagement/>
-</p:properties>
-</file>
-
-<file path=customXml/item3.xml><?xml version="1.0" encoding="utf-8"?>
-<?mso-contentType ?>
-<FormTemplates xmlns="http://schemas.microsoft.com/sharepoint/v3/contenttype/forms">
-  <Display>DocumentLibraryForm</Display>
-  <Edit>DocumentLibraryForm</Edit>
-  <New>DocumentLibraryForm</New>
-</FormTemplates>
-</file>
-
 <file path=customXml/itemProps1.xml><?xml version="1.0" encoding="utf-8"?>
-<ds:datastoreItem xmlns:ds="http://schemas.openxmlformats.org/officeDocument/2006/customXml" ds:itemID="{E8DB7DEB-074E-4EE8-9B6E-FD277323109C}">
+<ds:datastoreItem xmlns:ds="http://schemas.openxmlformats.org/officeDocument/2006/customXml" ds:itemID="{19E20559-B232-4371-8690-E3D8007EDB82}">
   <ds:schemaRefs>
-    <ds:schemaRef ds:uri="http://schemas.microsoft.com/office/2006/metadata/contentType"/>
-    <ds:schemaRef ds:uri="http://schemas.microsoft.com/office/2006/metadata/properties/metaAttributes"/>
-    <ds:schemaRef ds:uri="http://www.w3.org/2001/XMLSchema"/>
-    <ds:schemaRef ds:uri="http://schemas.microsoft.com/office/2006/metadata/properties"/>
-    <ds:schemaRef ds:uri="http://schemas.openxmlformats.org/package/2006/metadata/core-properties"/>
-    <ds:schemaRef ds:uri="http://purl.org/dc/elements/1.1/"/>
-    <ds:schemaRef ds:uri="http://purl.org/dc/terms/"/>
-    <ds:schemaRef ds:uri="http://schemas.microsoft.com/office/internal/2005/internalDocumentation"/>
+    <ds:schemaRef ds:uri="http://schemas.microsoft.com/sharepoint/v3/contenttype/forms"/>
   </ds:schemaRefs>
 </ds:datastoreItem>
 </file>
@@ -7631,9 +7691,16 @@
 </file>
 
 <file path=customXml/itemProps3.xml><?xml version="1.0" encoding="utf-8"?>
-<ds:datastoreItem xmlns:ds="http://schemas.openxmlformats.org/officeDocument/2006/customXml" ds:itemID="{19E20559-B232-4371-8690-E3D8007EDB82}">
+<ds:datastoreItem xmlns:ds="http://schemas.openxmlformats.org/officeDocument/2006/customXml" ds:itemID="{E8DB7DEB-074E-4EE8-9B6E-FD277323109C}">
   <ds:schemaRefs>
-    <ds:schemaRef ds:uri="http://schemas.microsoft.com/sharepoint/v3/contenttype/forms"/>
+    <ds:schemaRef ds:uri="http://schemas.microsoft.com/office/2006/metadata/contentType"/>
+    <ds:schemaRef ds:uri="http://schemas.microsoft.com/office/2006/metadata/properties/metaAttributes"/>
+    <ds:schemaRef ds:uri="http://www.w3.org/2001/XMLSchema"/>
+    <ds:schemaRef ds:uri="http://schemas.microsoft.com/office/2006/metadata/properties"/>
+    <ds:schemaRef ds:uri="http://schemas.openxmlformats.org/package/2006/metadata/core-properties"/>
+    <ds:schemaRef ds:uri="http://purl.org/dc/elements/1.1/"/>
+    <ds:schemaRef ds:uri="http://purl.org/dc/terms/"/>
+    <ds:schemaRef ds:uri="http://schemas.microsoft.com/office/internal/2005/internalDocumentation"/>
   </ds:schemaRefs>
 </ds:datastoreItem>
 </file>
</xml_diff>